<commit_message>
Auto stash before merge of "master" and "origin/master"
</commit_message>
<xml_diff>
--- a/PowerPoint/GastroGuide.pptx
+++ b/PowerPoint/GastroGuide.pptx
@@ -110,6 +110,11 @@
       </a:defRPr>
     </a:lvl9pPr>
   </p:defaultTextStyle>
+  <p:extLst>
+    <p:ext uri="{EFAFB233-063F-42B5-8137-9DF3F51BA10A}">
+      <p15:sldGuideLst xmlns:p15="http://schemas.microsoft.com/office/powerpoint/2012/main"/>
+    </p:ext>
+  </p:extLst>
 </p:presentation>
 </file>
 
@@ -3244,8 +3249,8 @@
         </p:blipFill>
         <p:spPr>
           <a:xfrm>
-            <a:off x="8688549" y="3125494"/>
-            <a:ext cx="1776419" cy="3220882"/>
+            <a:off x="8688549" y="3125495"/>
+            <a:ext cx="1776419" cy="3220880"/>
           </a:xfrm>
           <a:prstGeom prst="rect">
             <a:avLst/>

</xml_diff>